<commit_message>
updates for R TOT
</commit_message>
<xml_diff>
--- a/Week2/day5/presentation/Help Areas.pptx
+++ b/Week2/day5/presentation/Help Areas.pptx
@@ -219,7 +219,7 @@
           <a:p>
             <a:fld id="{4C525C9B-A32A-4A0A-AFC7-27D4628DCC07}" type="datetimeFigureOut">
               <a:rPr lang="en-GB" smtClean="0"/>
-              <a:t>20/02/2015</a:t>
+              <a:t>22/05/2015</a:t>
             </a:fld>
             <a:endParaRPr lang="en-GB"/>
           </a:p>
@@ -1128,7 +1128,7 @@
           <a:p>
             <a:fld id="{5F55417E-F374-4E16-81CA-AC1D1A31AE52}" type="datetimeFigureOut">
               <a:rPr lang="en-GB" smtClean="0"/>
-              <a:t>20/02/2015</a:t>
+              <a:t>22/05/2015</a:t>
             </a:fld>
             <a:endParaRPr lang="en-GB"/>
           </a:p>
@@ -1298,7 +1298,7 @@
           <a:p>
             <a:fld id="{5F55417E-F374-4E16-81CA-AC1D1A31AE52}" type="datetimeFigureOut">
               <a:rPr lang="en-GB" smtClean="0"/>
-              <a:t>20/02/2015</a:t>
+              <a:t>22/05/2015</a:t>
             </a:fld>
             <a:endParaRPr lang="en-GB"/>
           </a:p>
@@ -1478,7 +1478,7 @@
           <a:p>
             <a:fld id="{5F55417E-F374-4E16-81CA-AC1D1A31AE52}" type="datetimeFigureOut">
               <a:rPr lang="en-GB" smtClean="0"/>
-              <a:t>20/02/2015</a:t>
+              <a:t>22/05/2015</a:t>
             </a:fld>
             <a:endParaRPr lang="en-GB"/>
           </a:p>
@@ -1648,7 +1648,7 @@
           <a:p>
             <a:fld id="{5F55417E-F374-4E16-81CA-AC1D1A31AE52}" type="datetimeFigureOut">
               <a:rPr lang="en-GB" smtClean="0"/>
-              <a:t>20/02/2015</a:t>
+              <a:t>22/05/2015</a:t>
             </a:fld>
             <a:endParaRPr lang="en-GB"/>
           </a:p>
@@ -1894,7 +1894,7 @@
           <a:p>
             <a:fld id="{5F55417E-F374-4E16-81CA-AC1D1A31AE52}" type="datetimeFigureOut">
               <a:rPr lang="en-GB" smtClean="0"/>
-              <a:t>20/02/2015</a:t>
+              <a:t>22/05/2015</a:t>
             </a:fld>
             <a:endParaRPr lang="en-GB"/>
           </a:p>
@@ -2182,7 +2182,7 @@
           <a:p>
             <a:fld id="{5F55417E-F374-4E16-81CA-AC1D1A31AE52}" type="datetimeFigureOut">
               <a:rPr lang="en-GB" smtClean="0"/>
-              <a:t>20/02/2015</a:t>
+              <a:t>22/05/2015</a:t>
             </a:fld>
             <a:endParaRPr lang="en-GB"/>
           </a:p>
@@ -2604,7 +2604,7 @@
           <a:p>
             <a:fld id="{5F55417E-F374-4E16-81CA-AC1D1A31AE52}" type="datetimeFigureOut">
               <a:rPr lang="en-GB" smtClean="0"/>
-              <a:t>20/02/2015</a:t>
+              <a:t>22/05/2015</a:t>
             </a:fld>
             <a:endParaRPr lang="en-GB"/>
           </a:p>
@@ -2722,7 +2722,7 @@
           <a:p>
             <a:fld id="{5F55417E-F374-4E16-81CA-AC1D1A31AE52}" type="datetimeFigureOut">
               <a:rPr lang="en-GB" smtClean="0"/>
-              <a:t>20/02/2015</a:t>
+              <a:t>22/05/2015</a:t>
             </a:fld>
             <a:endParaRPr lang="en-GB"/>
           </a:p>
@@ -2817,7 +2817,7 @@
           <a:p>
             <a:fld id="{5F55417E-F374-4E16-81CA-AC1D1A31AE52}" type="datetimeFigureOut">
               <a:rPr lang="en-GB" smtClean="0"/>
-              <a:t>20/02/2015</a:t>
+              <a:t>22/05/2015</a:t>
             </a:fld>
             <a:endParaRPr lang="en-GB"/>
           </a:p>
@@ -3094,7 +3094,7 @@
           <a:p>
             <a:fld id="{5F55417E-F374-4E16-81CA-AC1D1A31AE52}" type="datetimeFigureOut">
               <a:rPr lang="en-GB" smtClean="0"/>
-              <a:t>20/02/2015</a:t>
+              <a:t>22/05/2015</a:t>
             </a:fld>
             <a:endParaRPr lang="en-GB"/>
           </a:p>
@@ -3347,7 +3347,7 @@
           <a:p>
             <a:fld id="{5F55417E-F374-4E16-81CA-AC1D1A31AE52}" type="datetimeFigureOut">
               <a:rPr lang="en-GB" smtClean="0"/>
-              <a:t>20/02/2015</a:t>
+              <a:t>22/05/2015</a:t>
             </a:fld>
             <a:endParaRPr lang="en-GB"/>
           </a:p>
@@ -3560,7 +3560,7 @@
           <a:p>
             <a:fld id="{5F55417E-F374-4E16-81CA-AC1D1A31AE52}" type="datetimeFigureOut">
               <a:rPr lang="en-GB" smtClean="0"/>
-              <a:t>20/02/2015</a:t>
+              <a:t>22/05/2015</a:t>
             </a:fld>
             <a:endParaRPr lang="en-GB"/>
           </a:p>
@@ -5004,7 +5004,11 @@
           <a:p>
             <a:r>
               <a:rPr lang="en-GB" dirty="0" smtClean="0"/>
-              <a:t>The Help Areas</a:t>
+              <a:t>The Help </a:t>
+            </a:r>
+            <a:r>
+              <a:rPr lang="en-GB" dirty="0" smtClean="0"/>
+              <a:t>Areas – rseek.org</a:t>
             </a:r>
             <a:endParaRPr lang="en-GB" dirty="0"/>
           </a:p>

</xml_diff>